<commit_message>
Banner und Startseite ┌（★ｏ☆）┘
</commit_message>
<xml_diff>
--- a/EinkaufsBuddy/01_Installation/02_Banner_Vorlage.pptx
+++ b/EinkaufsBuddy/01_Installation/02_Banner_Vorlage.pptx
@@ -240,7 +240,7 @@
           <a:p>
             <a:fld id="{705E03B7-B591-4A2A-B695-014C5A39F13E}" type="datetimeFigureOut">
               <a:rPr lang="de-DE"/>
-              <a:t>06.03.2015</a:t>
+              <a:t>07.03.2015</a:t>
             </a:fld>
             <a:endParaRPr/>
           </a:p>
@@ -405,7 +405,7 @@
           <a:p>
             <a:fld id="{67DFBD7B-E4FB-4AA8-9540-FD148073ACB3}" type="datetimeFigureOut">
               <a:rPr lang="de-DE"/>
-              <a:t>06.03.2015</a:t>
+              <a:t>07.03.2015</a:t>
             </a:fld>
             <a:endParaRPr/>
           </a:p>
@@ -703,162 +703,6 @@
           <a:chExt cx="0" cy="0"/>
         </a:xfrm>
       </p:grpSpPr>
-      <p:grpSp>
-        <p:nvGrpSpPr>
-          <p:cNvPr id="7" name="squares"/>
-          <p:cNvGrpSpPr/>
-          <p:nvPr/>
-        </p:nvGrpSpPr>
-        <p:grpSpPr>
-          <a:xfrm>
-            <a:off x="0" y="1135743"/>
-            <a:ext cx="1622332" cy="799981"/>
-            <a:chOff x="0" y="452558"/>
-            <a:chExt cx="914400" cy="524182"/>
-          </a:xfrm>
-        </p:grpSpPr>
-        <p:sp>
-          <p:nvSpPr>
-            <p:cNvPr id="8" name="Abgerundetes Rechteck 7"/>
-            <p:cNvSpPr/>
-            <p:nvPr/>
-          </p:nvSpPr>
-          <p:spPr>
-            <a:xfrm>
-              <a:off x="591671" y="452558"/>
-              <a:ext cx="322729" cy="524180"/>
-            </a:xfrm>
-            <a:prstGeom prst="roundRect">
-              <a:avLst/>
-            </a:prstGeom>
-            <a:solidFill>
-              <a:schemeClr val="accent3"/>
-            </a:solidFill>
-            <a:ln>
-              <a:noFill/>
-            </a:ln>
-          </p:spPr>
-          <p:style>
-            <a:lnRef idx="2">
-              <a:schemeClr val="accent1">
-                <a:shade val="50000"/>
-              </a:schemeClr>
-            </a:lnRef>
-            <a:fillRef idx="1">
-              <a:schemeClr val="accent1"/>
-            </a:fillRef>
-            <a:effectRef idx="0">
-              <a:schemeClr val="accent1"/>
-            </a:effectRef>
-            <a:fontRef idx="minor">
-              <a:schemeClr val="lt1"/>
-            </a:fontRef>
-          </p:style>
-          <p:txBody>
-            <a:bodyPr rtlCol="0" anchor="ctr"/>
-            <a:lstStyle/>
-            <a:p>
-              <a:pPr algn="ctr"/>
-              <a:endParaRPr lang="de-DE" noProof="0" dirty="0"/>
-            </a:p>
-          </p:txBody>
-        </p:sp>
-        <p:sp>
-          <p:nvSpPr>
-            <p:cNvPr id="9" name="Abgerundetes Rechteck 8"/>
-            <p:cNvSpPr/>
-            <p:nvPr/>
-          </p:nvSpPr>
-          <p:spPr>
-            <a:xfrm>
-              <a:off x="215154" y="452558"/>
-              <a:ext cx="322729" cy="524180"/>
-            </a:xfrm>
-            <a:prstGeom prst="roundRect">
-              <a:avLst/>
-            </a:prstGeom>
-            <a:solidFill>
-              <a:schemeClr val="accent2"/>
-            </a:solidFill>
-            <a:ln>
-              <a:noFill/>
-            </a:ln>
-          </p:spPr>
-          <p:style>
-            <a:lnRef idx="2">
-              <a:schemeClr val="accent1">
-                <a:shade val="50000"/>
-              </a:schemeClr>
-            </a:lnRef>
-            <a:fillRef idx="1">
-              <a:schemeClr val="accent1"/>
-            </a:fillRef>
-            <a:effectRef idx="0">
-              <a:schemeClr val="accent1"/>
-            </a:effectRef>
-            <a:fontRef idx="minor">
-              <a:schemeClr val="lt1"/>
-            </a:fontRef>
-          </p:style>
-          <p:txBody>
-            <a:bodyPr rtlCol="0" anchor="ctr"/>
-            <a:lstStyle/>
-            <a:p>
-              <a:pPr algn="ctr"/>
-              <a:endParaRPr lang="de-DE" noProof="0" dirty="0"/>
-            </a:p>
-          </p:txBody>
-        </p:sp>
-        <p:sp>
-          <p:nvSpPr>
-            <p:cNvPr id="10" name="Auf der gleichen Seite des Rechtecks liegende Ecken abrunden 9"/>
-            <p:cNvSpPr/>
-            <p:nvPr/>
-          </p:nvSpPr>
-          <p:spPr>
-            <a:xfrm rot="5400000">
-              <a:off x="-181408" y="633966"/>
-              <a:ext cx="524182" cy="161366"/>
-            </a:xfrm>
-            <a:prstGeom prst="round2SameRect">
-              <a:avLst>
-                <a:gd name="adj1" fmla="val 29167"/>
-                <a:gd name="adj2" fmla="val 0"/>
-              </a:avLst>
-            </a:prstGeom>
-            <a:solidFill>
-              <a:schemeClr val="accent1"/>
-            </a:solidFill>
-            <a:ln>
-              <a:noFill/>
-            </a:ln>
-          </p:spPr>
-          <p:style>
-            <a:lnRef idx="2">
-              <a:schemeClr val="accent1">
-                <a:shade val="50000"/>
-              </a:schemeClr>
-            </a:lnRef>
-            <a:fillRef idx="1">
-              <a:schemeClr val="accent1"/>
-            </a:fillRef>
-            <a:effectRef idx="0">
-              <a:schemeClr val="accent1"/>
-            </a:effectRef>
-            <a:fontRef idx="minor">
-              <a:schemeClr val="lt1"/>
-            </a:fontRef>
-          </p:style>
-          <p:txBody>
-            <a:bodyPr rtlCol="0" anchor="ctr"/>
-            <a:lstStyle/>
-            <a:p>
-              <a:pPr algn="ctr"/>
-              <a:endParaRPr lang="de-DE" noProof="0" dirty="0"/>
-            </a:p>
-          </p:txBody>
-        </p:sp>
-      </p:grpSp>
       <p:sp>
         <p:nvSpPr>
           <p:cNvPr id="2" name="Titel 1"/>
@@ -1032,7 +876,7 @@
           <a:p>
             <a:fld id="{A7209051-6E81-43E8-9099-FF6A0C3DCFE8}" type="datetime1">
               <a:rPr lang="de-DE" noProof="0" smtClean="0"/>
-              <a:t>06.03.2015</a:t>
+              <a:t>07.03.2015</a:t>
             </a:fld>
             <a:endParaRPr lang="de-DE" noProof="0" dirty="0"/>
           </a:p>
@@ -1242,7 +1086,7 @@
           <a:p>
             <a:fld id="{EDCEAB04-7709-4C1E-A61A-74684A0170FC}" type="datetime1">
               <a:rPr lang="de-DE" noProof="0" smtClean="0"/>
-              <a:t>06.03.2015</a:t>
+              <a:t>07.03.2015</a:t>
             </a:fld>
             <a:endParaRPr lang="de-DE" noProof="0" dirty="0"/>
           </a:p>
@@ -1796,7 +1640,7 @@
           <a:p>
             <a:fld id="{0C79BD0D-E0B1-4CED-AC65-708AC79EB9CD}" type="datetime1">
               <a:rPr lang="de-DE" noProof="0" smtClean="0"/>
-              <a:t>06.03.2015</a:t>
+              <a:t>07.03.2015</a:t>
             </a:fld>
             <a:endParaRPr lang="de-DE" noProof="0" dirty="0"/>
           </a:p>
@@ -2001,7 +1845,7 @@
           <a:p>
             <a:fld id="{0CC3EA6D-DF0B-4D4B-B359-5F1D1D0E30A4}" type="datetime1">
               <a:rPr lang="de-DE" noProof="0" smtClean="0"/>
-              <a:t>06.03.2015</a:t>
+              <a:t>07.03.2015</a:t>
             </a:fld>
             <a:endParaRPr lang="de-DE" noProof="0" dirty="0"/>
           </a:p>
@@ -2608,7 +2452,7 @@
           <a:p>
             <a:fld id="{977EDB99-15BC-4479-BAC5-1E502E66917A}" type="datetime1">
               <a:rPr lang="de-DE" noProof="0" smtClean="0"/>
-              <a:t>06.03.2015</a:t>
+              <a:t>07.03.2015</a:t>
             </a:fld>
             <a:endParaRPr lang="de-DE" noProof="0" dirty="0"/>
           </a:p>
@@ -2919,7 +2763,7 @@
           <a:p>
             <a:fld id="{4067C2A3-CD19-48AB-9F64-ECCF75182EDD}" type="datetime1">
               <a:rPr lang="de-DE" noProof="0" smtClean="0"/>
-              <a:t>06.03.2015</a:t>
+              <a:t>07.03.2015</a:t>
             </a:fld>
             <a:endParaRPr lang="de-DE" noProof="0" dirty="0"/>
           </a:p>
@@ -3383,7 +3227,7 @@
           <a:p>
             <a:fld id="{0363E8C1-7C87-4705-AB97-8CD17D208E3F}" type="datetime1">
               <a:rPr lang="de-DE" noProof="0" smtClean="0"/>
-              <a:t>06.03.2015</a:t>
+              <a:t>07.03.2015</a:t>
             </a:fld>
             <a:endParaRPr lang="de-DE" noProof="0" dirty="0"/>
           </a:p>
@@ -3520,7 +3364,7 @@
           <a:p>
             <a:fld id="{E20C624E-DF92-4841-B9B9-DD11AA239B85}" type="datetime1">
               <a:rPr lang="de-DE" noProof="0" smtClean="0"/>
-              <a:t>06.03.2015</a:t>
+              <a:t>07.03.2015</a:t>
             </a:fld>
             <a:endParaRPr lang="de-DE" noProof="0" dirty="0"/>
           </a:p>
@@ -3817,7 +3661,7 @@
           <a:p>
             <a:fld id="{FBDA3AE1-4360-4D5B-BDBC-656B872DD533}" type="datetime1">
               <a:rPr lang="de-DE" noProof="0" smtClean="0"/>
-              <a:t>06.03.2015</a:t>
+              <a:t>07.03.2015</a:t>
             </a:fld>
             <a:endParaRPr lang="de-DE" noProof="0" dirty="0"/>
           </a:p>
@@ -4124,7 +3968,7 @@
           <a:p>
             <a:fld id="{20990708-46A4-4851-883E-8DFB8939107E}" type="datetime1">
               <a:rPr lang="de-DE" noProof="0" smtClean="0"/>
-              <a:t>06.03.2015</a:t>
+              <a:t>07.03.2015</a:t>
             </a:fld>
             <a:endParaRPr lang="de-DE" noProof="0" dirty="0"/>
           </a:p>
@@ -4416,7 +4260,7 @@
           <a:p>
             <a:fld id="{AE88EFFC-86AE-4294-A319-CAFC2651994B}" type="datetime1">
               <a:rPr lang="de-DE" noProof="0" smtClean="0"/>
-              <a:t>06.03.2015</a:t>
+              <a:t>07.03.2015</a:t>
             </a:fld>
             <a:endParaRPr lang="de-DE" noProof="0" dirty="0"/>
           </a:p>
@@ -5021,7 +4865,7 @@
             <a:fld id="{D29E8617-6EA8-4B97-A5E8-E18E98765EE2}" type="datetime1">
               <a:rPr lang="de-DE" noProof="0" smtClean="0"/>
               <a:pPr/>
-              <a:t>06.03.2015</a:t>
+              <a:t>07.03.2015</a:t>
             </a:fld>
             <a:endParaRPr lang="de-DE" noProof="0" dirty="0"/>
           </a:p>
@@ -5434,7 +5278,7 @@
       </p:grpSpPr>
       <p:sp>
         <p:nvSpPr>
-          <p:cNvPr id="2" name="Titel 1"/>
+          <p:cNvPr id="4" name="Titel 3"/>
           <p:cNvSpPr>
             <a:spLocks noGrp="1"/>
           </p:cNvSpPr>
@@ -5442,27 +5286,18 @@
             <p:ph type="ctrTitle"/>
           </p:nvPr>
         </p:nvSpPr>
-        <p:spPr/>
+        <p:spPr>
+          <a:xfrm>
+            <a:off x="0" y="0"/>
+            <a:ext cx="9141619" cy="1676400"/>
+          </a:xfrm>
+        </p:spPr>
         <p:txBody>
           <a:bodyPr/>
           <a:lstStyle/>
           <a:p>
-            <a:pPr algn="l" defTabSz="1218987">
-              <a:lnSpc>
-                <a:spcPct val="80000"/>
-              </a:lnSpc>
-              <a:spcBef>
-                <a:spcPct val="0"/>
-              </a:spcBef>
-              <a:buNone/>
-            </a:pPr>
-            <a:r>
-              <a:rPr lang="de-DE" sz="6000" b="0" i="0" dirty="0" err="1" smtClean="0">
-                <a:solidFill>
-                  <a:srgbClr val="000000"/>
-                </a:solidFill>
-                <a:latin typeface="Constantia"/>
-              </a:rPr>
+            <a:r>
+              <a:rPr lang="de-DE" dirty="0" err="1" smtClean="0"/>
               <a:t>EinkaufsBuddy</a:t>
             </a:r>
             <a:endParaRPr lang="de-DE" dirty="0"/>
@@ -5471,7 +5306,7 @@
       </p:sp>
       <p:sp>
         <p:nvSpPr>
-          <p:cNvPr id="3" name="Untertitel 2"/>
+          <p:cNvPr id="5" name="Untertitel 4"/>
           <p:cNvSpPr>
             <a:spLocks noGrp="1"/>
           </p:cNvSpPr>
@@ -5479,21 +5314,19 @@
             <p:ph type="subTitle" idx="1"/>
           </p:nvPr>
         </p:nvSpPr>
-        <p:spPr/>
+        <p:spPr>
+          <a:xfrm>
+            <a:off x="1522412" y="1680882"/>
+            <a:ext cx="9141619" cy="886344"/>
+          </a:xfrm>
+        </p:spPr>
         <p:txBody>
           <a:bodyPr/>
           <a:lstStyle/>
           <a:p>
-            <a:pPr marL="0" indent="0" algn="l">
-              <a:buNone/>
-            </a:pPr>
-            <a:r>
-              <a:rPr lang="de-DE" dirty="0" smtClean="0">
-                <a:solidFill>
-                  <a:srgbClr val="89C01C"/>
-                </a:solidFill>
-              </a:rPr>
-              <a:t>Hier ein super toller Werbeslogan</a:t>
+            <a:r>
+              <a:rPr lang="de-DE" dirty="0" smtClean="0"/>
+              <a:t>Der schnelle Einkäufer</a:t>
             </a:r>
             <a:endParaRPr lang="de-DE" dirty="0"/>
           </a:p>

</xml_diff>